<commit_message>
applyNo -> 일반, 기타 분리
</commit_message>
<xml_diff>
--- a/report/fs/FS_ESS.근태관리프로젝트_근태패턴생성.pptx
+++ b/report/fs/FS_ESS.근태관리프로젝트_근태패턴생성.pptx
@@ -297,7 +297,7 @@
               <a:pPr>
                 <a:defRPr/>
               </a:pPr>
-              <a:t>2025-05-23</a:t>
+              <a:t>2025-05-29</a:t>
             </a:fld>
             <a:endParaRPr lang="ko-KR" altLang="en-US" dirty="0"/>
           </a:p>
@@ -504,7 +504,7 @@
               <a:pPr>
                 <a:defRPr/>
               </a:pPr>
-              <a:t>2025-05-23</a:t>
+              <a:t>2025-05-29</a:t>
             </a:fld>
             <a:endParaRPr lang="ko-KR" altLang="en-US" dirty="0"/>
           </a:p>
@@ -2060,7 +2060,7 @@
               <a:pPr>
                 <a:defRPr/>
               </a:pPr>
-              <a:t>2025-05-23</a:t>
+              <a:t>2025-05-29</a:t>
             </a:fld>
             <a:endParaRPr lang="ko-KR" altLang="en-US" dirty="0"/>
           </a:p>
@@ -11794,7 +11794,7 @@
           <p:nvPr>
             <p:extLst>
               <p:ext uri="{D42A27DB-BD31-4B8C-83A1-F6EECF244321}">
-                <p14:modId xmlns:p14="http://schemas.microsoft.com/office/powerpoint/2010/main" val="2060437125"/>
+                <p14:modId xmlns:p14="http://schemas.microsoft.com/office/powerpoint/2010/main" val="2587152673"/>
               </p:ext>
             </p:extLst>
           </p:nvPr>
@@ -12583,7 +12583,7 @@
                     </a:solidFill>
                   </a:tcPr>
                 </a:tc>
-                <a:tc>
+                <a:tc rowSpan="2">
                   <a:txBody>
                     <a:bodyPr/>
                     <a:lstStyle/>
@@ -12965,7 +12965,7 @@
                     </a:solidFill>
                   </a:tcPr>
                 </a:tc>
-                <a:tc>
+                <a:tc vMerge="1">
                   <a:txBody>
                     <a:bodyPr/>
                     <a:lstStyle/>

</xml_diff>